<commit_message>
Added handy links in powerpoint
</commit_message>
<xml_diff>
--- a/Polymer Presentation.pptx
+++ b/Polymer Presentation.pptx
@@ -141,6 +141,30 @@
         </pc:spChg>
         <pc:spChg chg="mod">
           <ac:chgData name="Pijnappel, Jelmer" userId="e4a3378c-c971-48f1-8cb8-8b89871ab05a" providerId="ADAL" clId="{977A5A2B-85D7-421B-A9AE-7F73003F6DFB}" dt="2018-12-19T07:57:41.168" v="286" actId="20577"/>
+          <ac:spMkLst>
+            <pc:docMk/>
+            <pc:sldMk cId="2109550090" sldId="260"/>
+            <ac:spMk id="3" creationId="{E8A64633-69A8-4434-BBD6-13F77D201C41}"/>
+          </ac:spMkLst>
+        </pc:spChg>
+      </pc:sldChg>
+    </pc:docChg>
+  </pc:docChgLst>
+  <pc:docChgLst>
+    <pc:chgData name="Pijnappel, Jelmer" userId="e4a3378c-c971-48f1-8cb8-8b89871ab05a" providerId="ADAL" clId="{5D192C82-F37A-465D-9F57-76BE2CF7A90F}"/>
+    <pc:docChg chg="custSel modSld">
+      <pc:chgData name="Pijnappel, Jelmer" userId="e4a3378c-c971-48f1-8cb8-8b89871ab05a" providerId="ADAL" clId="{5D192C82-F37A-465D-9F57-76BE2CF7A90F}" dt="2018-12-19T14:14:13.884" v="99" actId="113"/>
+      <pc:docMkLst>
+        <pc:docMk/>
+      </pc:docMkLst>
+      <pc:sldChg chg="modSp">
+        <pc:chgData name="Pijnappel, Jelmer" userId="e4a3378c-c971-48f1-8cb8-8b89871ab05a" providerId="ADAL" clId="{5D192C82-F37A-465D-9F57-76BE2CF7A90F}" dt="2018-12-19T14:14:13.884" v="99" actId="113"/>
+        <pc:sldMkLst>
+          <pc:docMk/>
+          <pc:sldMk cId="2109550090" sldId="260"/>
+        </pc:sldMkLst>
+        <pc:spChg chg="mod">
+          <ac:chgData name="Pijnappel, Jelmer" userId="e4a3378c-c971-48f1-8cb8-8b89871ab05a" providerId="ADAL" clId="{5D192C82-F37A-465D-9F57-76BE2CF7A90F}" dt="2018-12-19T14:14:13.884" v="99" actId="113"/>
           <ac:spMkLst>
             <pc:docMk/>
             <pc:sldMk cId="2109550090" sldId="260"/>
@@ -6201,7 +6225,9 @@
         </p:nvSpPr>
         <p:spPr/>
         <p:txBody>
-          <a:bodyPr/>
+          <a:bodyPr>
+            <a:normAutofit fontScale="92500"/>
+          </a:bodyPr>
           <a:lstStyle/>
           <a:p>
             <a:r>
@@ -6260,6 +6286,115 @@
               <a:rPr lang="nl-NL" dirty="0"/>
               <a:t>)</a:t>
             </a:r>
+          </a:p>
+          <a:p>
+            <a:endParaRPr lang="nl-NL" dirty="0"/>
+          </a:p>
+          <a:p>
+            <a:r>
+              <a:rPr lang="nl-NL" b="1" dirty="0"/>
+              <a:t>Handy links (</a:t>
+            </a:r>
+            <a:r>
+              <a:rPr lang="nl-NL" b="1" dirty="0" err="1"/>
+              <a:t>Not</a:t>
+            </a:r>
+            <a:r>
+              <a:rPr lang="nl-NL" b="1" dirty="0"/>
+              <a:t> </a:t>
+            </a:r>
+            <a:r>
+              <a:rPr lang="nl-NL" b="1" dirty="0" err="1"/>
+              <a:t>necessarily</a:t>
+            </a:r>
+            <a:r>
+              <a:rPr lang="nl-NL" b="1" dirty="0"/>
+              <a:t> </a:t>
+            </a:r>
+            <a:r>
+              <a:rPr lang="nl-NL" b="1" dirty="0" err="1"/>
+              <a:t>needed</a:t>
+            </a:r>
+            <a:r>
+              <a:rPr lang="nl-NL" b="1" dirty="0"/>
+              <a:t> </a:t>
+            </a:r>
+            <a:r>
+              <a:rPr lang="nl-NL" b="1" dirty="0" err="1"/>
+              <a:t>for</a:t>
+            </a:r>
+            <a:r>
+              <a:rPr lang="nl-NL" b="1" dirty="0"/>
+              <a:t> </a:t>
+            </a:r>
+            <a:r>
+              <a:rPr lang="nl-NL" b="1" dirty="0" err="1"/>
+              <a:t>this</a:t>
+            </a:r>
+            <a:r>
+              <a:rPr lang="nl-NL" b="1" dirty="0"/>
+              <a:t> course):</a:t>
+            </a:r>
+          </a:p>
+          <a:p>
+            <a:r>
+              <a:rPr lang="en-US" dirty="0"/>
+              <a:t>Awesome Polymer: </a:t>
+            </a:r>
+            <a:r>
+              <a:rPr lang="en-US" u="sng" dirty="0">
+                <a:hlinkClick r:id="rId3"/>
+              </a:rPr>
+              <a:t>https://github.com/Granze/awesome-polymer</a:t>
+            </a:r>
+            <a:endParaRPr lang="nl-NL" dirty="0"/>
+          </a:p>
+          <a:p>
+            <a:r>
+              <a:rPr lang="en-US" dirty="0"/>
+              <a:t>Handling events in Polymer: </a:t>
+            </a:r>
+            <a:r>
+              <a:rPr lang="nl-NL" u="sng" dirty="0">
+                <a:hlinkClick r:id="rId4"/>
+              </a:rPr>
+              <a:t>https://alligator.io/polymer/handling-events/</a:t>
+            </a:r>
+            <a:endParaRPr lang="nl-NL" dirty="0"/>
+          </a:p>
+          <a:p>
+            <a:r>
+              <a:rPr lang="en-US" dirty="0"/>
+              <a:t>Polymer 2 </a:t>
+            </a:r>
+            <a:r>
+              <a:rPr lang="en-US" dirty="0" err="1"/>
+              <a:t>cheatsheet</a:t>
+            </a:r>
+            <a:r>
+              <a:rPr lang="en-US" dirty="0"/>
+              <a:t>: </a:t>
+            </a:r>
+            <a:r>
+              <a:rPr lang="en-US" u="sng" dirty="0">
+                <a:hlinkClick r:id="rId5"/>
+              </a:rPr>
+              <a:t>https://meowni.ca/posts/polymer-2-cheatsheet/</a:t>
+            </a:r>
+            <a:endParaRPr lang="nl-NL" dirty="0"/>
+          </a:p>
+          <a:p>
+            <a:r>
+              <a:rPr lang="en-US" dirty="0"/>
+              <a:t>Web components library: </a:t>
+            </a:r>
+            <a:r>
+              <a:rPr lang="en-US" u="sng" dirty="0">
+                <a:hlinkClick r:id="rId6"/>
+              </a:rPr>
+              <a:t>https://www.webcomponents.org</a:t>
+            </a:r>
+            <a:endParaRPr lang="nl-NL" dirty="0"/>
           </a:p>
           <a:p>
             <a:endParaRPr lang="nl-NL" dirty="0"/>

</xml_diff>

<commit_message>
Dots on the i's for the presentation
</commit_message>
<xml_diff>
--- a/Polymer Presentation.pptx
+++ b/Polymer Presentation.pptx
@@ -153,12 +153,26 @@
   <pc:docChgLst>
     <pc:chgData name="Pijnappel, Jelmer" userId="e4a3378c-c971-48f1-8cb8-8b89871ab05a" providerId="ADAL" clId="{5D192C82-F37A-465D-9F57-76BE2CF7A90F}"/>
     <pc:docChg chg="custSel modSld">
-      <pc:chgData name="Pijnappel, Jelmer" userId="e4a3378c-c971-48f1-8cb8-8b89871ab05a" providerId="ADAL" clId="{5D192C82-F37A-465D-9F57-76BE2CF7A90F}" dt="2018-12-19T14:14:13.884" v="99" actId="113"/>
+      <pc:chgData name="Pijnappel, Jelmer" userId="e4a3378c-c971-48f1-8cb8-8b89871ab05a" providerId="ADAL" clId="{5D192C82-F37A-465D-9F57-76BE2CF7A90F}" dt="2018-12-19T15:32:21.463" v="117"/>
       <pc:docMkLst>
         <pc:docMk/>
       </pc:docMkLst>
-      <pc:sldChg chg="modSp">
-        <pc:chgData name="Pijnappel, Jelmer" userId="e4a3378c-c971-48f1-8cb8-8b89871ab05a" providerId="ADAL" clId="{5D192C82-F37A-465D-9F57-76BE2CF7A90F}" dt="2018-12-19T14:14:13.884" v="99" actId="113"/>
+      <pc:sldChg chg="modAnim">
+        <pc:chgData name="Pijnappel, Jelmer" userId="e4a3378c-c971-48f1-8cb8-8b89871ab05a" providerId="ADAL" clId="{5D192C82-F37A-465D-9F57-76BE2CF7A90F}" dt="2018-12-19T15:32:21.463" v="117"/>
+        <pc:sldMkLst>
+          <pc:docMk/>
+          <pc:sldMk cId="2193324989" sldId="258"/>
+        </pc:sldMkLst>
+      </pc:sldChg>
+      <pc:sldChg chg="modAnim">
+        <pc:chgData name="Pijnappel, Jelmer" userId="e4a3378c-c971-48f1-8cb8-8b89871ab05a" providerId="ADAL" clId="{5D192C82-F37A-465D-9F57-76BE2CF7A90F}" dt="2018-12-19T15:31:15.485" v="105"/>
+        <pc:sldMkLst>
+          <pc:docMk/>
+          <pc:sldMk cId="603047748" sldId="259"/>
+        </pc:sldMkLst>
+      </pc:sldChg>
+      <pc:sldChg chg="modSp modAnim">
+        <pc:chgData name="Pijnappel, Jelmer" userId="e4a3378c-c971-48f1-8cb8-8b89871ab05a" providerId="ADAL" clId="{5D192C82-F37A-465D-9F57-76BE2CF7A90F}" dt="2018-12-19T15:31:54.891" v="114"/>
         <pc:sldMkLst>
           <pc:docMk/>
           <pc:sldMk cId="2109550090" sldId="260"/>
@@ -5174,7 +5188,7 @@
                                     </p:set>
                                     <p:animEffect transition="in" filter="fade">
                                       <p:cBhvr>
-                                        <p:cTn id="26" dur="500"/>
+                                        <p:cTn id="26" dur="250"/>
                                         <p:tgtEl>
                                           <p:spTgt spid="3">
                                             <p:txEl>
@@ -5187,15 +5201,24 @@
                                   </p:childTnLst>
                                 </p:cTn>
                               </p:par>
+                            </p:childTnLst>
+                          </p:cTn>
+                        </p:par>
+                        <p:par>
+                          <p:cTn id="27" fill="hold">
+                            <p:stCondLst>
+                              <p:cond delay="750"/>
+                            </p:stCondLst>
+                            <p:childTnLst>
                               <p:par>
-                                <p:cTn id="27" presetID="10" presetClass="entr" presetSubtype="0" fill="hold" nodeType="withEffect">
+                                <p:cTn id="28" presetID="10" presetClass="entr" presetSubtype="0" fill="hold" nodeType="afterEffect">
                                   <p:stCondLst>
                                     <p:cond delay="0"/>
                                   </p:stCondLst>
                                   <p:childTnLst>
                                     <p:set>
                                       <p:cBhvr>
-                                        <p:cTn id="28" dur="1" fill="hold">
+                                        <p:cTn id="29" dur="1" fill="hold">
                                           <p:stCondLst>
                                             <p:cond delay="0"/>
                                           </p:stCondLst>
@@ -5217,7 +5240,7 @@
                                     </p:set>
                                     <p:animEffect transition="in" filter="fade">
                                       <p:cBhvr>
-                                        <p:cTn id="29" dur="500"/>
+                                        <p:cTn id="30" dur="250"/>
                                         <p:tgtEl>
                                           <p:spTgt spid="3">
                                             <p:txEl>
@@ -5230,15 +5253,24 @@
                                   </p:childTnLst>
                                 </p:cTn>
                               </p:par>
+                            </p:childTnLst>
+                          </p:cTn>
+                        </p:par>
+                        <p:par>
+                          <p:cTn id="31" fill="hold">
+                            <p:stCondLst>
+                              <p:cond delay="1000"/>
+                            </p:stCondLst>
+                            <p:childTnLst>
                               <p:par>
-                                <p:cTn id="30" presetID="10" presetClass="entr" presetSubtype="0" fill="hold" nodeType="withEffect">
+                                <p:cTn id="32" presetID="10" presetClass="entr" presetSubtype="0" fill="hold" nodeType="afterEffect">
                                   <p:stCondLst>
                                     <p:cond delay="0"/>
                                   </p:stCondLst>
                                   <p:childTnLst>
                                     <p:set>
                                       <p:cBhvr>
-                                        <p:cTn id="31" dur="1" fill="hold">
+                                        <p:cTn id="33" dur="1" fill="hold">
                                           <p:stCondLst>
                                             <p:cond delay="0"/>
                                           </p:stCondLst>
@@ -5260,7 +5292,7 @@
                                     </p:set>
                                     <p:animEffect transition="in" filter="fade">
                                       <p:cBhvr>
-                                        <p:cTn id="32" dur="500"/>
+                                        <p:cTn id="34" dur="250"/>
                                         <p:tgtEl>
                                           <p:spTgt spid="3">
                                             <p:txEl>
@@ -5273,15 +5305,24 @@
                                   </p:childTnLst>
                                 </p:cTn>
                               </p:par>
+                            </p:childTnLst>
+                          </p:cTn>
+                        </p:par>
+                        <p:par>
+                          <p:cTn id="35" fill="hold">
+                            <p:stCondLst>
+                              <p:cond delay="1250"/>
+                            </p:stCondLst>
+                            <p:childTnLst>
                               <p:par>
-                                <p:cTn id="33" presetID="10" presetClass="entr" presetSubtype="0" fill="hold" nodeType="withEffect">
+                                <p:cTn id="36" presetID="10" presetClass="entr" presetSubtype="0" fill="hold" nodeType="afterEffect">
                                   <p:stCondLst>
                                     <p:cond delay="0"/>
                                   </p:stCondLst>
                                   <p:childTnLst>
                                     <p:set>
                                       <p:cBhvr>
-                                        <p:cTn id="34" dur="1" fill="hold">
+                                        <p:cTn id="37" dur="1" fill="hold">
                                           <p:stCondLst>
                                             <p:cond delay="0"/>
                                           </p:stCondLst>
@@ -5303,7 +5344,7 @@
                                     </p:set>
                                     <p:animEffect transition="in" filter="fade">
                                       <p:cBhvr>
-                                        <p:cTn id="35" dur="500"/>
+                                        <p:cTn id="38" dur="250"/>
                                         <p:tgtEl>
                                           <p:spTgt spid="3">
                                             <p:txEl>
@@ -5944,43 +5985,21 @@
                                   </p:childTnLst>
                                 </p:cTn>
                               </p:par>
-                            </p:childTnLst>
-                          </p:cTn>
-                        </p:par>
-                      </p:childTnLst>
-                    </p:cTn>
-                  </p:par>
-                  <p:par>
-                    <p:cTn id="8" fill="hold">
-                      <p:stCondLst>
-                        <p:cond delay="indefinite"/>
-                      </p:stCondLst>
-                      <p:childTnLst>
-                        <p:par>
-                          <p:cTn id="9" fill="hold">
-                            <p:stCondLst>
-                              <p:cond delay="0"/>
-                            </p:stCondLst>
-                            <p:childTnLst>
                               <p:par>
-                                <p:cTn id="10" presetID="10" presetClass="entr" presetSubtype="0" fill="hold" nodeType="clickEffect">
+                                <p:cTn id="8" presetID="10" presetClass="entr" presetSubtype="0" fill="hold" nodeType="withEffect">
                                   <p:stCondLst>
                                     <p:cond delay="0"/>
                                   </p:stCondLst>
                                   <p:childTnLst>
                                     <p:set>
                                       <p:cBhvr>
-                                        <p:cTn id="11" dur="1" fill="hold">
+                                        <p:cTn id="9" dur="1" fill="hold">
                                           <p:stCondLst>
                                             <p:cond delay="0"/>
                                           </p:stCondLst>
                                         </p:cTn>
                                         <p:tgtEl>
-                                          <p:spTgt spid="7">
-                                            <p:txEl>
-                                              <p:pRg st="0" end="0"/>
-                                            </p:txEl>
-                                          </p:spTgt>
+                                          <p:spTgt spid="6"/>
                                         </p:tgtEl>
                                         <p:attrNameLst>
                                           <p:attrName>style.visibility</p:attrName>
@@ -5992,13 +6011,9 @@
                                     </p:set>
                                     <p:animEffect transition="in" filter="fade">
                                       <p:cBhvr>
-                                        <p:cTn id="12" dur="500"/>
-                                        <p:tgtEl>
-                                          <p:spTgt spid="7">
-                                            <p:txEl>
-                                              <p:pRg st="0" end="0"/>
-                                            </p:txEl>
-                                          </p:spTgt>
+                                        <p:cTn id="10" dur="500"/>
+                                        <p:tgtEl>
+                                          <p:spTgt spid="6"/>
                                         </p:tgtEl>
                                       </p:cBhvr>
                                     </p:animEffect>
@@ -6012,26 +6027,26 @@
                     </p:cTn>
                   </p:par>
                   <p:par>
-                    <p:cTn id="13" fill="hold">
+                    <p:cTn id="11" fill="hold">
                       <p:stCondLst>
                         <p:cond delay="indefinite"/>
                       </p:stCondLst>
                       <p:childTnLst>
                         <p:par>
-                          <p:cTn id="14" fill="hold">
+                          <p:cTn id="12" fill="hold">
                             <p:stCondLst>
                               <p:cond delay="0"/>
                             </p:stCondLst>
                             <p:childTnLst>
                               <p:par>
-                                <p:cTn id="15" presetID="10" presetClass="entr" presetSubtype="0" fill="hold" nodeType="clickEffect">
+                                <p:cTn id="13" presetID="10" presetClass="entr" presetSubtype="0" fill="hold" nodeType="clickEffect">
                                   <p:stCondLst>
                                     <p:cond delay="0"/>
                                   </p:stCondLst>
                                   <p:childTnLst>
                                     <p:set>
                                       <p:cBhvr>
-                                        <p:cTn id="16" dur="1" fill="hold">
+                                        <p:cTn id="14" dur="1" fill="hold">
                                           <p:stCondLst>
                                             <p:cond delay="0"/>
                                           </p:stCondLst>
@@ -6039,7 +6054,7 @@
                                         <p:tgtEl>
                                           <p:spTgt spid="7">
                                             <p:txEl>
-                                              <p:pRg st="7" end="7"/>
+                                              <p:pRg st="0" end="0"/>
                                             </p:txEl>
                                           </p:spTgt>
                                         </p:tgtEl>
@@ -6053,13 +6068,48 @@
                                     </p:set>
                                     <p:animEffect transition="in" filter="fade">
                                       <p:cBhvr>
-                                        <p:cTn id="17" dur="500"/>
+                                        <p:cTn id="15" dur="500"/>
                                         <p:tgtEl>
                                           <p:spTgt spid="7">
                                             <p:txEl>
-                                              <p:pRg st="7" end="7"/>
+                                              <p:pRg st="0" end="0"/>
                                             </p:txEl>
                                           </p:spTgt>
+                                        </p:tgtEl>
+                                      </p:cBhvr>
+                                    </p:animEffect>
+                                  </p:childTnLst>
+                                </p:cTn>
+                              </p:par>
+                              <p:par>
+                                <p:cTn id="16" presetID="10" presetClass="entr" presetSubtype="0" fill="hold" nodeType="withEffect">
+                                  <p:stCondLst>
+                                    <p:cond delay="0"/>
+                                  </p:stCondLst>
+                                  <p:childTnLst>
+                                    <p:set>
+                                      <p:cBhvr>
+                                        <p:cTn id="17" dur="1" fill="hold">
+                                          <p:stCondLst>
+                                            <p:cond delay="0"/>
+                                          </p:stCondLst>
+                                        </p:cTn>
+                                        <p:tgtEl>
+                                          <p:spTgt spid="8"/>
+                                        </p:tgtEl>
+                                        <p:attrNameLst>
+                                          <p:attrName>style.visibility</p:attrName>
+                                        </p:attrNameLst>
+                                      </p:cBhvr>
+                                      <p:to>
+                                        <p:strVal val="visible"/>
+                                      </p:to>
+                                    </p:set>
+                                    <p:animEffect transition="in" filter="fade">
+                                      <p:cBhvr>
+                                        <p:cTn id="18" dur="500"/>
+                                        <p:tgtEl>
+                                          <p:spTgt spid="8"/>
                                         </p:tgtEl>
                                       </p:cBhvr>
                                     </p:animEffect>
@@ -6073,26 +6123,87 @@
                     </p:cTn>
                   </p:par>
                   <p:par>
-                    <p:cTn id="18" fill="hold">
+                    <p:cTn id="19" fill="hold">
                       <p:stCondLst>
                         <p:cond delay="indefinite"/>
                       </p:stCondLst>
                       <p:childTnLst>
                         <p:par>
-                          <p:cTn id="19" fill="hold">
+                          <p:cTn id="20" fill="hold">
                             <p:stCondLst>
                               <p:cond delay="0"/>
                             </p:stCondLst>
                             <p:childTnLst>
                               <p:par>
-                                <p:cTn id="20" presetID="10" presetClass="entr" presetSubtype="0" fill="hold" nodeType="clickEffect">
+                                <p:cTn id="21" presetID="10" presetClass="entr" presetSubtype="0" fill="hold" nodeType="clickEffect">
                                   <p:stCondLst>
                                     <p:cond delay="0"/>
                                   </p:stCondLst>
                                   <p:childTnLst>
                                     <p:set>
                                       <p:cBhvr>
-                                        <p:cTn id="21" dur="1" fill="hold">
+                                        <p:cTn id="22" dur="1" fill="hold">
+                                          <p:stCondLst>
+                                            <p:cond delay="0"/>
+                                          </p:stCondLst>
+                                        </p:cTn>
+                                        <p:tgtEl>
+                                          <p:spTgt spid="7">
+                                            <p:txEl>
+                                              <p:pRg st="7" end="7"/>
+                                            </p:txEl>
+                                          </p:spTgt>
+                                        </p:tgtEl>
+                                        <p:attrNameLst>
+                                          <p:attrName>style.visibility</p:attrName>
+                                        </p:attrNameLst>
+                                      </p:cBhvr>
+                                      <p:to>
+                                        <p:strVal val="visible"/>
+                                      </p:to>
+                                    </p:set>
+                                    <p:animEffect transition="in" filter="fade">
+                                      <p:cBhvr>
+                                        <p:cTn id="23" dur="500"/>
+                                        <p:tgtEl>
+                                          <p:spTgt spid="7">
+                                            <p:txEl>
+                                              <p:pRg st="7" end="7"/>
+                                            </p:txEl>
+                                          </p:spTgt>
+                                        </p:tgtEl>
+                                      </p:cBhvr>
+                                    </p:animEffect>
+                                  </p:childTnLst>
+                                </p:cTn>
+                              </p:par>
+                            </p:childTnLst>
+                          </p:cTn>
+                        </p:par>
+                      </p:childTnLst>
+                    </p:cTn>
+                  </p:par>
+                  <p:par>
+                    <p:cTn id="24" fill="hold">
+                      <p:stCondLst>
+                        <p:cond delay="indefinite"/>
+                      </p:stCondLst>
+                      <p:childTnLst>
+                        <p:par>
+                          <p:cTn id="25" fill="hold">
+                            <p:stCondLst>
+                              <p:cond delay="0"/>
+                            </p:stCondLst>
+                            <p:childTnLst>
+                              <p:par>
+                                <p:cTn id="26" presetID="10" presetClass="entr" presetSubtype="0" fill="hold" nodeType="clickEffect">
+                                  <p:stCondLst>
+                                    <p:cond delay="0"/>
+                                  </p:stCondLst>
+                                  <p:childTnLst>
+                                    <p:set>
+                                      <p:cBhvr>
+                                        <p:cTn id="27" dur="1" fill="hold">
                                           <p:stCondLst>
                                             <p:cond delay="0"/>
                                           </p:stCondLst>
@@ -6114,7 +6225,7 @@
                                     </p:set>
                                     <p:animEffect transition="in" filter="fade">
                                       <p:cBhvr>
-                                        <p:cTn id="22" dur="500"/>
+                                        <p:cTn id="28" dur="500"/>
                                         <p:tgtEl>
                                           <p:spTgt spid="7">
                                             <p:txEl>
@@ -6411,6 +6522,427 @@
   <p:clrMapOvr>
     <a:masterClrMapping/>
   </p:clrMapOvr>
+  <p:timing>
+    <p:tnLst>
+      <p:par>
+        <p:cTn id="1" dur="indefinite" restart="never" nodeType="tmRoot">
+          <p:childTnLst>
+            <p:seq concurrent="1" nextAc="seek">
+              <p:cTn id="2" dur="indefinite" nodeType="mainSeq">
+                <p:childTnLst>
+                  <p:par>
+                    <p:cTn id="3" fill="hold">
+                      <p:stCondLst>
+                        <p:cond delay="indefinite"/>
+                      </p:stCondLst>
+                      <p:childTnLst>
+                        <p:par>
+                          <p:cTn id="4" fill="hold">
+                            <p:stCondLst>
+                              <p:cond delay="0"/>
+                            </p:stCondLst>
+                            <p:childTnLst>
+                              <p:par>
+                                <p:cTn id="5" presetID="10" presetClass="entr" presetSubtype="0" fill="hold" nodeType="clickEffect">
+                                  <p:stCondLst>
+                                    <p:cond delay="0"/>
+                                  </p:stCondLst>
+                                  <p:childTnLst>
+                                    <p:set>
+                                      <p:cBhvr>
+                                        <p:cTn id="6" dur="1" fill="hold">
+                                          <p:stCondLst>
+                                            <p:cond delay="0"/>
+                                          </p:stCondLst>
+                                        </p:cTn>
+                                        <p:tgtEl>
+                                          <p:spTgt spid="3">
+                                            <p:txEl>
+                                              <p:pRg st="0" end="0"/>
+                                            </p:txEl>
+                                          </p:spTgt>
+                                        </p:tgtEl>
+                                        <p:attrNameLst>
+                                          <p:attrName>style.visibility</p:attrName>
+                                        </p:attrNameLst>
+                                      </p:cBhvr>
+                                      <p:to>
+                                        <p:strVal val="visible"/>
+                                      </p:to>
+                                    </p:set>
+                                    <p:animEffect transition="in" filter="fade">
+                                      <p:cBhvr>
+                                        <p:cTn id="7" dur="500"/>
+                                        <p:tgtEl>
+                                          <p:spTgt spid="3">
+                                            <p:txEl>
+                                              <p:pRg st="0" end="0"/>
+                                            </p:txEl>
+                                          </p:spTgt>
+                                        </p:tgtEl>
+                                      </p:cBhvr>
+                                    </p:animEffect>
+                                  </p:childTnLst>
+                                </p:cTn>
+                              </p:par>
+                            </p:childTnLst>
+                          </p:cTn>
+                        </p:par>
+                      </p:childTnLst>
+                    </p:cTn>
+                  </p:par>
+                  <p:par>
+                    <p:cTn id="8" fill="hold">
+                      <p:stCondLst>
+                        <p:cond delay="indefinite"/>
+                      </p:stCondLst>
+                      <p:childTnLst>
+                        <p:par>
+                          <p:cTn id="9" fill="hold">
+                            <p:stCondLst>
+                              <p:cond delay="0"/>
+                            </p:stCondLst>
+                            <p:childTnLst>
+                              <p:par>
+                                <p:cTn id="10" presetID="10" presetClass="entr" presetSubtype="0" fill="hold" nodeType="clickEffect">
+                                  <p:stCondLst>
+                                    <p:cond delay="0"/>
+                                  </p:stCondLst>
+                                  <p:childTnLst>
+                                    <p:set>
+                                      <p:cBhvr>
+                                        <p:cTn id="11" dur="1" fill="hold">
+                                          <p:stCondLst>
+                                            <p:cond delay="0"/>
+                                          </p:stCondLst>
+                                        </p:cTn>
+                                        <p:tgtEl>
+                                          <p:spTgt spid="3">
+                                            <p:txEl>
+                                              <p:pRg st="1" end="1"/>
+                                            </p:txEl>
+                                          </p:spTgt>
+                                        </p:tgtEl>
+                                        <p:attrNameLst>
+                                          <p:attrName>style.visibility</p:attrName>
+                                        </p:attrNameLst>
+                                      </p:cBhvr>
+                                      <p:to>
+                                        <p:strVal val="visible"/>
+                                      </p:to>
+                                    </p:set>
+                                    <p:animEffect transition="in" filter="fade">
+                                      <p:cBhvr>
+                                        <p:cTn id="12" dur="500"/>
+                                        <p:tgtEl>
+                                          <p:spTgt spid="3">
+                                            <p:txEl>
+                                              <p:pRg st="1" end="1"/>
+                                            </p:txEl>
+                                          </p:spTgt>
+                                        </p:tgtEl>
+                                      </p:cBhvr>
+                                    </p:animEffect>
+                                  </p:childTnLst>
+                                </p:cTn>
+                              </p:par>
+                            </p:childTnLst>
+                          </p:cTn>
+                        </p:par>
+                      </p:childTnLst>
+                    </p:cTn>
+                  </p:par>
+                  <p:par>
+                    <p:cTn id="13" fill="hold">
+                      <p:stCondLst>
+                        <p:cond delay="indefinite"/>
+                      </p:stCondLst>
+                      <p:childTnLst>
+                        <p:par>
+                          <p:cTn id="14" fill="hold">
+                            <p:stCondLst>
+                              <p:cond delay="0"/>
+                            </p:stCondLst>
+                            <p:childTnLst>
+                              <p:par>
+                                <p:cTn id="15" presetID="10" presetClass="entr" presetSubtype="0" fill="hold" nodeType="clickEffect">
+                                  <p:stCondLst>
+                                    <p:cond delay="0"/>
+                                  </p:stCondLst>
+                                  <p:childTnLst>
+                                    <p:set>
+                                      <p:cBhvr>
+                                        <p:cTn id="16" dur="1" fill="hold">
+                                          <p:stCondLst>
+                                            <p:cond delay="0"/>
+                                          </p:stCondLst>
+                                        </p:cTn>
+                                        <p:tgtEl>
+                                          <p:spTgt spid="3">
+                                            <p:txEl>
+                                              <p:pRg st="3" end="3"/>
+                                            </p:txEl>
+                                          </p:spTgt>
+                                        </p:tgtEl>
+                                        <p:attrNameLst>
+                                          <p:attrName>style.visibility</p:attrName>
+                                        </p:attrNameLst>
+                                      </p:cBhvr>
+                                      <p:to>
+                                        <p:strVal val="visible"/>
+                                      </p:to>
+                                    </p:set>
+                                    <p:animEffect transition="in" filter="fade">
+                                      <p:cBhvr>
+                                        <p:cTn id="17" dur="500"/>
+                                        <p:tgtEl>
+                                          <p:spTgt spid="3">
+                                            <p:txEl>
+                                              <p:pRg st="3" end="3"/>
+                                            </p:txEl>
+                                          </p:spTgt>
+                                        </p:tgtEl>
+                                      </p:cBhvr>
+                                    </p:animEffect>
+                                  </p:childTnLst>
+                                </p:cTn>
+                              </p:par>
+                            </p:childTnLst>
+                          </p:cTn>
+                        </p:par>
+                        <p:par>
+                          <p:cTn id="18" fill="hold">
+                            <p:stCondLst>
+                              <p:cond delay="500"/>
+                            </p:stCondLst>
+                            <p:childTnLst>
+                              <p:par>
+                                <p:cTn id="19" presetID="10" presetClass="entr" presetSubtype="0" fill="hold" nodeType="afterEffect">
+                                  <p:stCondLst>
+                                    <p:cond delay="0"/>
+                                  </p:stCondLst>
+                                  <p:childTnLst>
+                                    <p:set>
+                                      <p:cBhvr>
+                                        <p:cTn id="20" dur="1" fill="hold">
+                                          <p:stCondLst>
+                                            <p:cond delay="0"/>
+                                          </p:stCondLst>
+                                        </p:cTn>
+                                        <p:tgtEl>
+                                          <p:spTgt spid="3">
+                                            <p:txEl>
+                                              <p:pRg st="4" end="4"/>
+                                            </p:txEl>
+                                          </p:spTgt>
+                                        </p:tgtEl>
+                                        <p:attrNameLst>
+                                          <p:attrName>style.visibility</p:attrName>
+                                        </p:attrNameLst>
+                                      </p:cBhvr>
+                                      <p:to>
+                                        <p:strVal val="visible"/>
+                                      </p:to>
+                                    </p:set>
+                                    <p:animEffect transition="in" filter="fade">
+                                      <p:cBhvr>
+                                        <p:cTn id="21" dur="250"/>
+                                        <p:tgtEl>
+                                          <p:spTgt spid="3">
+                                            <p:txEl>
+                                              <p:pRg st="4" end="4"/>
+                                            </p:txEl>
+                                          </p:spTgt>
+                                        </p:tgtEl>
+                                      </p:cBhvr>
+                                    </p:animEffect>
+                                  </p:childTnLst>
+                                </p:cTn>
+                              </p:par>
+                            </p:childTnLst>
+                          </p:cTn>
+                        </p:par>
+                        <p:par>
+                          <p:cTn id="22" fill="hold">
+                            <p:stCondLst>
+                              <p:cond delay="750"/>
+                            </p:stCondLst>
+                            <p:childTnLst>
+                              <p:par>
+                                <p:cTn id="23" presetID="10" presetClass="entr" presetSubtype="0" fill="hold" nodeType="afterEffect">
+                                  <p:stCondLst>
+                                    <p:cond delay="0"/>
+                                  </p:stCondLst>
+                                  <p:childTnLst>
+                                    <p:set>
+                                      <p:cBhvr>
+                                        <p:cTn id="24" dur="1" fill="hold">
+                                          <p:stCondLst>
+                                            <p:cond delay="0"/>
+                                          </p:stCondLst>
+                                        </p:cTn>
+                                        <p:tgtEl>
+                                          <p:spTgt spid="3">
+                                            <p:txEl>
+                                              <p:pRg st="5" end="5"/>
+                                            </p:txEl>
+                                          </p:spTgt>
+                                        </p:tgtEl>
+                                        <p:attrNameLst>
+                                          <p:attrName>style.visibility</p:attrName>
+                                        </p:attrNameLst>
+                                      </p:cBhvr>
+                                      <p:to>
+                                        <p:strVal val="visible"/>
+                                      </p:to>
+                                    </p:set>
+                                    <p:animEffect transition="in" filter="fade">
+                                      <p:cBhvr>
+                                        <p:cTn id="25" dur="250"/>
+                                        <p:tgtEl>
+                                          <p:spTgt spid="3">
+                                            <p:txEl>
+                                              <p:pRg st="5" end="5"/>
+                                            </p:txEl>
+                                          </p:spTgt>
+                                        </p:tgtEl>
+                                      </p:cBhvr>
+                                    </p:animEffect>
+                                  </p:childTnLst>
+                                </p:cTn>
+                              </p:par>
+                            </p:childTnLst>
+                          </p:cTn>
+                        </p:par>
+                        <p:par>
+                          <p:cTn id="26" fill="hold">
+                            <p:stCondLst>
+                              <p:cond delay="1000"/>
+                            </p:stCondLst>
+                            <p:childTnLst>
+                              <p:par>
+                                <p:cTn id="27" presetID="10" presetClass="entr" presetSubtype="0" fill="hold" nodeType="afterEffect">
+                                  <p:stCondLst>
+                                    <p:cond delay="0"/>
+                                  </p:stCondLst>
+                                  <p:childTnLst>
+                                    <p:set>
+                                      <p:cBhvr>
+                                        <p:cTn id="28" dur="1" fill="hold">
+                                          <p:stCondLst>
+                                            <p:cond delay="0"/>
+                                          </p:stCondLst>
+                                        </p:cTn>
+                                        <p:tgtEl>
+                                          <p:spTgt spid="3">
+                                            <p:txEl>
+                                              <p:pRg st="6" end="6"/>
+                                            </p:txEl>
+                                          </p:spTgt>
+                                        </p:tgtEl>
+                                        <p:attrNameLst>
+                                          <p:attrName>style.visibility</p:attrName>
+                                        </p:attrNameLst>
+                                      </p:cBhvr>
+                                      <p:to>
+                                        <p:strVal val="visible"/>
+                                      </p:to>
+                                    </p:set>
+                                    <p:animEffect transition="in" filter="fade">
+                                      <p:cBhvr>
+                                        <p:cTn id="29" dur="250"/>
+                                        <p:tgtEl>
+                                          <p:spTgt spid="3">
+                                            <p:txEl>
+                                              <p:pRg st="6" end="6"/>
+                                            </p:txEl>
+                                          </p:spTgt>
+                                        </p:tgtEl>
+                                      </p:cBhvr>
+                                    </p:animEffect>
+                                  </p:childTnLst>
+                                </p:cTn>
+                              </p:par>
+                            </p:childTnLst>
+                          </p:cTn>
+                        </p:par>
+                        <p:par>
+                          <p:cTn id="30" fill="hold">
+                            <p:stCondLst>
+                              <p:cond delay="1250"/>
+                            </p:stCondLst>
+                            <p:childTnLst>
+                              <p:par>
+                                <p:cTn id="31" presetID="10" presetClass="entr" presetSubtype="0" fill="hold" nodeType="afterEffect">
+                                  <p:stCondLst>
+                                    <p:cond delay="0"/>
+                                  </p:stCondLst>
+                                  <p:childTnLst>
+                                    <p:set>
+                                      <p:cBhvr>
+                                        <p:cTn id="32" dur="1" fill="hold">
+                                          <p:stCondLst>
+                                            <p:cond delay="0"/>
+                                          </p:stCondLst>
+                                        </p:cTn>
+                                        <p:tgtEl>
+                                          <p:spTgt spid="3">
+                                            <p:txEl>
+                                              <p:pRg st="7" end="7"/>
+                                            </p:txEl>
+                                          </p:spTgt>
+                                        </p:tgtEl>
+                                        <p:attrNameLst>
+                                          <p:attrName>style.visibility</p:attrName>
+                                        </p:attrNameLst>
+                                      </p:cBhvr>
+                                      <p:to>
+                                        <p:strVal val="visible"/>
+                                      </p:to>
+                                    </p:set>
+                                    <p:animEffect transition="in" filter="fade">
+                                      <p:cBhvr>
+                                        <p:cTn id="33" dur="250"/>
+                                        <p:tgtEl>
+                                          <p:spTgt spid="3">
+                                            <p:txEl>
+                                              <p:pRg st="7" end="7"/>
+                                            </p:txEl>
+                                          </p:spTgt>
+                                        </p:tgtEl>
+                                      </p:cBhvr>
+                                    </p:animEffect>
+                                  </p:childTnLst>
+                                </p:cTn>
+                              </p:par>
+                            </p:childTnLst>
+                          </p:cTn>
+                        </p:par>
+                      </p:childTnLst>
+                    </p:cTn>
+                  </p:par>
+                </p:childTnLst>
+              </p:cTn>
+              <p:prevCondLst>
+                <p:cond evt="onPrev" delay="0">
+                  <p:tgtEl>
+                    <p:sldTgt/>
+                  </p:tgtEl>
+                </p:cond>
+              </p:prevCondLst>
+              <p:nextCondLst>
+                <p:cond evt="onNext" delay="0">
+                  <p:tgtEl>
+                    <p:sldTgt/>
+                  </p:tgtEl>
+                </p:cond>
+              </p:nextCondLst>
+            </p:seq>
+          </p:childTnLst>
+        </p:cTn>
+      </p:par>
+    </p:tnLst>
+  </p:timing>
 </p:sld>
 </file>
 

</xml_diff>